<commit_message>
listo la base de datos y scripts sql
</commit_message>
<xml_diff>
--- a/docs/MER.pptx
+++ b/docs/MER.pptx
@@ -104,6 +104,11 @@
       </a:defRPr>
     </a:lvl9pPr>
   </p:defaultTextStyle>
+  <p:extLst>
+    <p:ext uri="{EFAFB233-063F-42B5-8137-9DF3F51BA10A}">
+      <p15:sldGuideLst xmlns:p15="http://schemas.microsoft.com/office/powerpoint/2012/main"/>
+    </p:ext>
+  </p:extLst>
 </p:presentation>
 </file>
 
@@ -238,7 +243,7 @@
           <a:p>
             <a:fld id="{1DEE5C8B-0FD6-4D89-9C0E-77ACC5742FB7}" type="datetimeFigureOut">
               <a:rPr lang="es-VE" smtClean="0"/>
-              <a:t>25/7/2021</a:t>
+              <a:t>26/7/2021</a:t>
             </a:fld>
             <a:endParaRPr lang="es-VE"/>
           </a:p>
@@ -408,7 +413,7 @@
           <a:p>
             <a:fld id="{1DEE5C8B-0FD6-4D89-9C0E-77ACC5742FB7}" type="datetimeFigureOut">
               <a:rPr lang="es-VE" smtClean="0"/>
-              <a:t>25/7/2021</a:t>
+              <a:t>26/7/2021</a:t>
             </a:fld>
             <a:endParaRPr lang="es-VE"/>
           </a:p>
@@ -588,7 +593,7 @@
           <a:p>
             <a:fld id="{1DEE5C8B-0FD6-4D89-9C0E-77ACC5742FB7}" type="datetimeFigureOut">
               <a:rPr lang="es-VE" smtClean="0"/>
-              <a:t>25/7/2021</a:t>
+              <a:t>26/7/2021</a:t>
             </a:fld>
             <a:endParaRPr lang="es-VE"/>
           </a:p>
@@ -758,7 +763,7 @@
           <a:p>
             <a:fld id="{1DEE5C8B-0FD6-4D89-9C0E-77ACC5742FB7}" type="datetimeFigureOut">
               <a:rPr lang="es-VE" smtClean="0"/>
-              <a:t>25/7/2021</a:t>
+              <a:t>26/7/2021</a:t>
             </a:fld>
             <a:endParaRPr lang="es-VE"/>
           </a:p>
@@ -1004,7 +1009,7 @@
           <a:p>
             <a:fld id="{1DEE5C8B-0FD6-4D89-9C0E-77ACC5742FB7}" type="datetimeFigureOut">
               <a:rPr lang="es-VE" smtClean="0"/>
-              <a:t>25/7/2021</a:t>
+              <a:t>26/7/2021</a:t>
             </a:fld>
             <a:endParaRPr lang="es-VE"/>
           </a:p>
@@ -1236,7 +1241,7 @@
           <a:p>
             <a:fld id="{1DEE5C8B-0FD6-4D89-9C0E-77ACC5742FB7}" type="datetimeFigureOut">
               <a:rPr lang="es-VE" smtClean="0"/>
-              <a:t>25/7/2021</a:t>
+              <a:t>26/7/2021</a:t>
             </a:fld>
             <a:endParaRPr lang="es-VE"/>
           </a:p>
@@ -1603,7 +1608,7 @@
           <a:p>
             <a:fld id="{1DEE5C8B-0FD6-4D89-9C0E-77ACC5742FB7}" type="datetimeFigureOut">
               <a:rPr lang="es-VE" smtClean="0"/>
-              <a:t>25/7/2021</a:t>
+              <a:t>26/7/2021</a:t>
             </a:fld>
             <a:endParaRPr lang="es-VE"/>
           </a:p>
@@ -1721,7 +1726,7 @@
           <a:p>
             <a:fld id="{1DEE5C8B-0FD6-4D89-9C0E-77ACC5742FB7}" type="datetimeFigureOut">
               <a:rPr lang="es-VE" smtClean="0"/>
-              <a:t>25/7/2021</a:t>
+              <a:t>26/7/2021</a:t>
             </a:fld>
             <a:endParaRPr lang="es-VE"/>
           </a:p>
@@ -1816,7 +1821,7 @@
           <a:p>
             <a:fld id="{1DEE5C8B-0FD6-4D89-9C0E-77ACC5742FB7}" type="datetimeFigureOut">
               <a:rPr lang="es-VE" smtClean="0"/>
-              <a:t>25/7/2021</a:t>
+              <a:t>26/7/2021</a:t>
             </a:fld>
             <a:endParaRPr lang="es-VE"/>
           </a:p>
@@ -2093,7 +2098,7 @@
           <a:p>
             <a:fld id="{1DEE5C8B-0FD6-4D89-9C0E-77ACC5742FB7}" type="datetimeFigureOut">
               <a:rPr lang="es-VE" smtClean="0"/>
-              <a:t>25/7/2021</a:t>
+              <a:t>26/7/2021</a:t>
             </a:fld>
             <a:endParaRPr lang="es-VE"/>
           </a:p>
@@ -2346,7 +2351,7 @@
           <a:p>
             <a:fld id="{1DEE5C8B-0FD6-4D89-9C0E-77ACC5742FB7}" type="datetimeFigureOut">
               <a:rPr lang="es-VE" smtClean="0"/>
-              <a:t>25/7/2021</a:t>
+              <a:t>26/7/2021</a:t>
             </a:fld>
             <a:endParaRPr lang="es-VE"/>
           </a:p>
@@ -2559,7 +2564,7 @@
           <a:p>
             <a:fld id="{1DEE5C8B-0FD6-4D89-9C0E-77ACC5742FB7}" type="datetimeFigureOut">
               <a:rPr lang="es-VE" smtClean="0"/>
-              <a:t>25/7/2021</a:t>
+              <a:t>26/7/2021</a:t>
             </a:fld>
             <a:endParaRPr lang="es-VE"/>
           </a:p>
@@ -2964,6 +2969,244 @@
           <a:chExt cx="0" cy="0"/>
         </a:xfrm>
       </p:grpSpPr>
+      <p:sp>
+        <p:nvSpPr>
+          <p:cNvPr id="32" name="Rectángulo redondeado 31"/>
+          <p:cNvSpPr/>
+          <p:nvPr/>
+        </p:nvSpPr>
+        <p:spPr>
+          <a:xfrm>
+            <a:off x="7823157" y="2913180"/>
+            <a:ext cx="321972" cy="184735"/>
+          </a:xfrm>
+          <a:prstGeom prst="roundRect">
+            <a:avLst/>
+          </a:prstGeom>
+        </p:spPr>
+        <p:style>
+          <a:lnRef idx="2">
+            <a:schemeClr val="accent1">
+              <a:shade val="50000"/>
+            </a:schemeClr>
+          </a:lnRef>
+          <a:fillRef idx="1">
+            <a:schemeClr val="accent1"/>
+          </a:fillRef>
+          <a:effectRef idx="0">
+            <a:schemeClr val="accent1"/>
+          </a:effectRef>
+          <a:fontRef idx="minor">
+            <a:schemeClr val="lt1"/>
+          </a:fontRef>
+        </p:style>
+        <p:txBody>
+          <a:bodyPr rtlCol="0" anchor="ctr"/>
+          <a:lstStyle/>
+          <a:p>
+            <a:pPr algn="ctr"/>
+            <a:endParaRPr lang="es-VE"/>
+          </a:p>
+        </p:txBody>
+      </p:sp>
+      <p:cxnSp>
+        <p:nvCxnSpPr>
+          <p:cNvPr id="34" name="Conector angular 33"/>
+          <p:cNvCxnSpPr>
+            <a:stCxn id="240" idx="3"/>
+            <a:endCxn id="32" idx="1"/>
+          </p:cNvCxnSpPr>
+          <p:nvPr/>
+        </p:nvCxnSpPr>
+        <p:spPr>
+          <a:xfrm flipV="1">
+            <a:off x="5126157" y="3005548"/>
+            <a:ext cx="2697000" cy="210706"/>
+          </a:xfrm>
+          <a:prstGeom prst="bentConnector3">
+            <a:avLst>
+              <a:gd name="adj1" fmla="val 73876"/>
+            </a:avLst>
+          </a:prstGeom>
+          <a:ln>
+            <a:tailEnd type="triangle"/>
+          </a:ln>
+        </p:spPr>
+        <p:style>
+          <a:lnRef idx="1">
+            <a:schemeClr val="accent1"/>
+          </a:lnRef>
+          <a:fillRef idx="0">
+            <a:schemeClr val="accent1"/>
+          </a:fillRef>
+          <a:effectRef idx="0">
+            <a:schemeClr val="accent1"/>
+          </a:effectRef>
+          <a:fontRef idx="minor">
+            <a:schemeClr val="tx1"/>
+          </a:fontRef>
+        </p:style>
+      </p:cxnSp>
+      <p:sp>
+        <p:nvSpPr>
+          <p:cNvPr id="224" name="Rectángulo redondeado 223"/>
+          <p:cNvSpPr/>
+          <p:nvPr/>
+        </p:nvSpPr>
+        <p:spPr>
+          <a:xfrm>
+            <a:off x="8383398" y="2374756"/>
+            <a:ext cx="301542" cy="167425"/>
+          </a:xfrm>
+          <a:prstGeom prst="roundRect">
+            <a:avLst/>
+          </a:prstGeom>
+        </p:spPr>
+        <p:style>
+          <a:lnRef idx="2">
+            <a:schemeClr val="accent1">
+              <a:shade val="50000"/>
+            </a:schemeClr>
+          </a:lnRef>
+          <a:fillRef idx="1">
+            <a:schemeClr val="accent1"/>
+          </a:fillRef>
+          <a:effectRef idx="0">
+            <a:schemeClr val="accent1"/>
+          </a:effectRef>
+          <a:fontRef idx="minor">
+            <a:schemeClr val="lt1"/>
+          </a:fontRef>
+        </p:style>
+        <p:txBody>
+          <a:bodyPr rtlCol="0" anchor="ctr"/>
+          <a:lstStyle/>
+          <a:p>
+            <a:pPr algn="ctr"/>
+            <a:endParaRPr lang="es-VE"/>
+          </a:p>
+        </p:txBody>
+      </p:sp>
+      <p:sp>
+        <p:nvSpPr>
+          <p:cNvPr id="82" name="Rectángulo redondeado 81"/>
+          <p:cNvSpPr/>
+          <p:nvPr/>
+        </p:nvSpPr>
+        <p:spPr>
+          <a:xfrm>
+            <a:off x="8383398" y="2034282"/>
+            <a:ext cx="301542" cy="167425"/>
+          </a:xfrm>
+          <a:prstGeom prst="roundRect">
+            <a:avLst/>
+          </a:prstGeom>
+        </p:spPr>
+        <p:style>
+          <a:lnRef idx="2">
+            <a:schemeClr val="accent1">
+              <a:shade val="50000"/>
+            </a:schemeClr>
+          </a:lnRef>
+          <a:fillRef idx="1">
+            <a:schemeClr val="accent1"/>
+          </a:fillRef>
+          <a:effectRef idx="0">
+            <a:schemeClr val="accent1"/>
+          </a:effectRef>
+          <a:fontRef idx="minor">
+            <a:schemeClr val="lt1"/>
+          </a:fontRef>
+        </p:style>
+        <p:txBody>
+          <a:bodyPr rtlCol="0" anchor="ctr"/>
+          <a:lstStyle/>
+          <a:p>
+            <a:pPr algn="ctr"/>
+            <a:endParaRPr lang="es-VE"/>
+          </a:p>
+        </p:txBody>
+      </p:sp>
+      <p:sp>
+        <p:nvSpPr>
+          <p:cNvPr id="83" name="Rectángulo redondeado 82"/>
+          <p:cNvSpPr/>
+          <p:nvPr/>
+        </p:nvSpPr>
+        <p:spPr>
+          <a:xfrm>
+            <a:off x="9787288" y="1868077"/>
+            <a:ext cx="301542" cy="167425"/>
+          </a:xfrm>
+          <a:prstGeom prst="roundRect">
+            <a:avLst/>
+          </a:prstGeom>
+        </p:spPr>
+        <p:style>
+          <a:lnRef idx="2">
+            <a:schemeClr val="accent1">
+              <a:shade val="50000"/>
+            </a:schemeClr>
+          </a:lnRef>
+          <a:fillRef idx="1">
+            <a:schemeClr val="accent1"/>
+          </a:fillRef>
+          <a:effectRef idx="0">
+            <a:schemeClr val="accent1"/>
+          </a:effectRef>
+          <a:fontRef idx="minor">
+            <a:schemeClr val="lt1"/>
+          </a:fontRef>
+        </p:style>
+        <p:txBody>
+          <a:bodyPr rtlCol="0" anchor="ctr"/>
+          <a:lstStyle/>
+          <a:p>
+            <a:pPr algn="ctr"/>
+            <a:endParaRPr lang="es-VE"/>
+          </a:p>
+        </p:txBody>
+      </p:sp>
+      <p:sp>
+        <p:nvSpPr>
+          <p:cNvPr id="2" name="Rectángulo redondeado 1"/>
+          <p:cNvSpPr/>
+          <p:nvPr/>
+        </p:nvSpPr>
+        <p:spPr>
+          <a:xfrm>
+            <a:off x="8393613" y="1617372"/>
+            <a:ext cx="301542" cy="154547"/>
+          </a:xfrm>
+          <a:prstGeom prst="roundRect">
+            <a:avLst/>
+          </a:prstGeom>
+        </p:spPr>
+        <p:style>
+          <a:lnRef idx="2">
+            <a:schemeClr val="accent1">
+              <a:shade val="50000"/>
+            </a:schemeClr>
+          </a:lnRef>
+          <a:fillRef idx="1">
+            <a:schemeClr val="accent1"/>
+          </a:fillRef>
+          <a:effectRef idx="0">
+            <a:schemeClr val="accent1"/>
+          </a:effectRef>
+          <a:fontRef idx="minor">
+            <a:schemeClr val="lt1"/>
+          </a:fontRef>
+        </p:style>
+        <p:txBody>
+          <a:bodyPr rtlCol="0" anchor="ctr"/>
+          <a:lstStyle/>
+          <a:p>
+            <a:pPr algn="ctr"/>
+            <a:endParaRPr lang="es-VE"/>
+          </a:p>
+        </p:txBody>
+      </p:sp>
       <p:cxnSp>
         <p:nvCxnSpPr>
           <p:cNvPr id="243" name="Conector angular 242"/>
@@ -3173,14 +3416,14 @@
         </p:nvCxnSpPr>
         <p:spPr>
           <a:xfrm rot="10800000" flipH="1">
-            <a:off x="6371847" y="777386"/>
-            <a:ext cx="294594" cy="3841301"/>
+            <a:off x="6371846" y="777386"/>
+            <a:ext cx="307473" cy="3841301"/>
           </a:xfrm>
           <a:prstGeom prst="bentConnector5">
             <a:avLst>
-              <a:gd name="adj1" fmla="val 324602"/>
-              <a:gd name="adj2" fmla="val 99956"/>
-              <a:gd name="adj3" fmla="val 177598"/>
+              <a:gd name="adj1" fmla="val -74348"/>
+              <a:gd name="adj2" fmla="val -962"/>
+              <a:gd name="adj3" fmla="val 283252"/>
             </a:avLst>
           </a:prstGeom>
           <a:ln>
@@ -3650,7 +3893,7 @@
         </p:nvSpPr>
         <p:spPr>
           <a:xfrm>
-            <a:off x="6344469" y="688843"/>
+            <a:off x="6357348" y="688843"/>
             <a:ext cx="321972" cy="177084"/>
           </a:xfrm>
           <a:prstGeom prst="roundRect">
@@ -5064,13 +5307,13 @@
           <p:nvPr>
             <p:extLst>
               <p:ext uri="{D42A27DB-BD31-4B8C-83A1-F6EECF244321}">
-                <p14:modId xmlns:p14="http://schemas.microsoft.com/office/powerpoint/2010/main" val="2637348874"/>
+                <p14:modId xmlns:p14="http://schemas.microsoft.com/office/powerpoint/2010/main" val="3177467071"/>
               </p:ext>
             </p:extLst>
           </p:nvPr>
         </p:nvGraphicFramePr>
         <p:xfrm>
-          <a:off x="2472744" y="2583522"/>
+          <a:off x="2472742" y="2583522"/>
           <a:ext cx="866105" cy="1143000"/>
         </p:xfrm>
         <a:graphic>
@@ -5351,13 +5594,13 @@
           <p:nvPr>
             <p:extLst>
               <p:ext uri="{D42A27DB-BD31-4B8C-83A1-F6EECF244321}">
-                <p14:modId xmlns:p14="http://schemas.microsoft.com/office/powerpoint/2010/main" val="2521938058"/>
+                <p14:modId xmlns:p14="http://schemas.microsoft.com/office/powerpoint/2010/main" val="3890830541"/>
               </p:ext>
             </p:extLst>
           </p:nvPr>
         </p:nvGraphicFramePr>
         <p:xfrm>
-          <a:off x="4274175" y="364097"/>
+          <a:off x="4287056" y="364097"/>
           <a:ext cx="762000" cy="952500"/>
         </p:xfrm>
         <a:graphic>
@@ -5402,12 +5645,12 @@
                     <a:p>
                       <a:pPr algn="l" fontAlgn="b"/>
                       <a:r>
-                        <a:rPr lang="es-VE" sz="1100" u="none" strike="noStrike">
+                        <a:rPr lang="es-VE" sz="1100" u="none" strike="noStrike" dirty="0" err="1">
                           <a:effectLst/>
                         </a:rPr>
                         <a:t>id_copa</a:t>
                       </a:r>
-                      <a:endParaRPr lang="es-VE" sz="1100" b="0" i="0" u="none" strike="noStrike">
+                      <a:endParaRPr lang="es-VE" sz="1100" b="0" i="0" u="none" strike="noStrike" dirty="0">
                         <a:solidFill>
                           <a:srgbClr val="000000"/>
                         </a:solidFill>
@@ -5825,13 +6068,13 @@
           <p:nvPr>
             <p:extLst>
               <p:ext uri="{D42A27DB-BD31-4B8C-83A1-F6EECF244321}">
-                <p14:modId xmlns:p14="http://schemas.microsoft.com/office/powerpoint/2010/main" val="3956665021"/>
+                <p14:modId xmlns:p14="http://schemas.microsoft.com/office/powerpoint/2010/main" val="1169395811"/>
               </p:ext>
             </p:extLst>
           </p:nvPr>
         </p:nvGraphicFramePr>
         <p:xfrm>
-          <a:off x="5624847" y="304197"/>
+          <a:off x="5624848" y="304197"/>
           <a:ext cx="1072167" cy="2667000"/>
         </p:xfrm>
         <a:graphic>
@@ -5876,12 +6119,12 @@
                     <a:p>
                       <a:pPr algn="l" fontAlgn="b"/>
                       <a:r>
-                        <a:rPr lang="es-VE" sz="1100" u="none" strike="noStrike">
+                        <a:rPr lang="es-VE" sz="1100" u="none" strike="noStrike" dirty="0" err="1">
                           <a:effectLst/>
                         </a:rPr>
                         <a:t>id_jugador</a:t>
                       </a:r>
-                      <a:endParaRPr lang="es-VE" sz="1100" b="0" i="0" u="none" strike="noStrike">
+                      <a:endParaRPr lang="es-VE" sz="1100" b="0" i="0" u="none" strike="noStrike" dirty="0">
                         <a:solidFill>
                           <a:srgbClr val="000000"/>
                         </a:solidFill>
@@ -5901,12 +6144,12 @@
                     <a:p>
                       <a:pPr algn="l" fontAlgn="b"/>
                       <a:r>
-                        <a:rPr lang="es-VE" sz="1100" u="none" strike="noStrike">
+                        <a:rPr lang="es-VE" sz="1100" u="none" strike="noStrike" dirty="0" err="1">
                           <a:effectLst/>
                         </a:rPr>
                         <a:t>id_club</a:t>
                       </a:r>
-                      <a:endParaRPr lang="es-VE" sz="1100" b="0" i="0" u="none" strike="noStrike">
+                      <a:endParaRPr lang="es-VE" sz="1100" b="0" i="0" u="none" strike="noStrike" dirty="0">
                         <a:solidFill>
                           <a:srgbClr val="000000"/>
                         </a:solidFill>
@@ -6206,13 +6449,13 @@
           <p:nvPr>
             <p:extLst>
               <p:ext uri="{D42A27DB-BD31-4B8C-83A1-F6EECF244321}">
-                <p14:modId xmlns:p14="http://schemas.microsoft.com/office/powerpoint/2010/main" val="1627435134"/>
+                <p14:modId xmlns:p14="http://schemas.microsoft.com/office/powerpoint/2010/main" val="4235426054"/>
               </p:ext>
             </p:extLst>
           </p:nvPr>
         </p:nvGraphicFramePr>
         <p:xfrm>
-          <a:off x="4044000" y="2902385"/>
+          <a:off x="4044000" y="2915255"/>
           <a:ext cx="1123681" cy="960583"/>
         </p:xfrm>
         <a:graphic>
@@ -6307,10 +6550,10 @@
                     <a:p>
                       <a:pPr algn="l" fontAlgn="b"/>
                       <a:r>
-                        <a:rPr lang="es-VE" sz="1100" u="none" strike="noStrike" dirty="0" err="1">
-                          <a:effectLst/>
-                        </a:rPr>
-                        <a:t>id_pais</a:t>
+                        <a:rPr lang="es-VE" sz="1100" u="none" strike="noStrike" dirty="0" err="1" smtClean="0">
+                          <a:effectLst/>
+                        </a:rPr>
+                        <a:t>id_país</a:t>
                       </a:r>
                       <a:endParaRPr lang="es-VE" sz="1100" b="0" i="0" u="none" strike="noStrike" dirty="0">
                         <a:solidFill>
@@ -6332,7 +6575,7 @@
                     <a:p>
                       <a:pPr algn="l" fontAlgn="b"/>
                       <a:r>
-                        <a:rPr lang="es-VE" sz="1100" u="none" strike="noStrike" dirty="0" err="1">
+                        <a:rPr lang="es-VE" sz="1100" u="none" strike="noStrike" dirty="0" err="1" smtClean="0">
                           <a:effectLst/>
                         </a:rPr>
                         <a:t>tx_persona</a:t>
@@ -6362,14 +6605,14 @@
           <p:nvPr>
             <p:extLst>
               <p:ext uri="{D42A27DB-BD31-4B8C-83A1-F6EECF244321}">
-                <p14:modId xmlns:p14="http://schemas.microsoft.com/office/powerpoint/2010/main" val="3574564893"/>
+                <p14:modId xmlns:p14="http://schemas.microsoft.com/office/powerpoint/2010/main" val="1695803497"/>
               </p:ext>
             </p:extLst>
           </p:nvPr>
         </p:nvGraphicFramePr>
         <p:xfrm>
           <a:off x="7814254" y="865803"/>
-          <a:ext cx="917620" cy="2049780"/>
+          <a:ext cx="917620" cy="2385060"/>
         </p:xfrm>
         <a:graphic>
           <a:graphicData uri="http://schemas.openxmlformats.org/drawingml/2006/table">
@@ -6513,12 +6756,12 @@
                     <a:p>
                       <a:pPr algn="l" fontAlgn="b"/>
                       <a:r>
-                        <a:rPr lang="es-VE" sz="1100" u="none" strike="noStrike">
-                          <a:effectLst/>
-                        </a:rPr>
-                        <a:t>lf_partido</a:t>
-                      </a:r>
-                      <a:endParaRPr lang="es-VE" sz="1100" b="0" i="0" u="none" strike="noStrike">
+                        <a:rPr lang="es-VE" sz="1100" u="none" strike="noStrike" dirty="0" err="1" smtClean="0">
+                          <a:effectLst/>
+                        </a:rPr>
+                        <a:t>dt_partido</a:t>
+                      </a:r>
+                      <a:endParaRPr lang="es-VE" sz="1100" b="0" i="0" u="none" strike="noStrike" dirty="0">
                         <a:solidFill>
                           <a:srgbClr val="000000"/>
                         </a:solidFill>
@@ -6630,6 +6873,46 @@
                           <a:latin typeface="Calibri" panose="020F0502020204030204" pitchFamily="34" charset="0"/>
                         </a:rPr>
                         <a:t>Id_persona</a:t>
+                      </a:r>
+                      <a:endParaRPr lang="en-US" sz="1100" b="0" i="0" u="none" strike="noStrike" dirty="0" smtClean="0">
+                        <a:solidFill>
+                          <a:srgbClr val="000000"/>
+                        </a:solidFill>
+                        <a:effectLst/>
+                        <a:latin typeface="Calibri" panose="020F0502020204030204" pitchFamily="34" charset="0"/>
+                      </a:endParaRPr>
+                    </a:p>
+                    <a:p>
+                      <a:pPr algn="l" fontAlgn="b"/>
+                      <a:r>
+                        <a:rPr lang="es-VE" sz="1100" b="0" i="0" u="none" strike="noStrike" dirty="0" err="1" smtClean="0">
+                          <a:solidFill>
+                            <a:srgbClr val="000000"/>
+                          </a:solidFill>
+                          <a:effectLst/>
+                          <a:latin typeface="Calibri" panose="020F0502020204030204" pitchFamily="34" charset="0"/>
+                        </a:rPr>
+                        <a:t>id_persona_var</a:t>
+                      </a:r>
+                      <a:endParaRPr lang="es-VE" sz="1100" b="0" i="0" u="none" strike="noStrike" dirty="0" smtClean="0">
+                        <a:solidFill>
+                          <a:srgbClr val="000000"/>
+                        </a:solidFill>
+                        <a:effectLst/>
+                        <a:latin typeface="Calibri" panose="020F0502020204030204" pitchFamily="34" charset="0"/>
+                      </a:endParaRPr>
+                    </a:p>
+                    <a:p>
+                      <a:pPr algn="l" fontAlgn="b"/>
+                      <a:r>
+                        <a:rPr lang="es-VE" sz="1100" b="0" i="0" u="none" strike="noStrike" dirty="0" err="1" smtClean="0">
+                          <a:solidFill>
+                            <a:srgbClr val="000000"/>
+                          </a:solidFill>
+                          <a:effectLst/>
+                          <a:latin typeface="Calibri" panose="020F0502020204030204" pitchFamily="34" charset="0"/>
+                        </a:rPr>
+                        <a:t>hr_partido</a:t>
                       </a:r>
                       <a:endParaRPr lang="es-VE" sz="1100" b="0" i="0" u="none" strike="noStrike" dirty="0">
                         <a:solidFill>
@@ -7050,12 +7333,12 @@
                     <a:p>
                       <a:pPr algn="l" fontAlgn="b"/>
                       <a:r>
-                        <a:rPr lang="es-VE" sz="1100" u="none" strike="noStrike">
+                        <a:rPr lang="es-VE" sz="1100" u="none" strike="noStrike" dirty="0" err="1">
                           <a:effectLst/>
                         </a:rPr>
                         <a:t>id_copa</a:t>
                       </a:r>
-                      <a:endParaRPr lang="es-VE" sz="1100" b="0" i="0" u="none" strike="noStrike">
+                      <a:endParaRPr lang="es-VE" sz="1100" b="0" i="0" u="none" strike="noStrike" dirty="0">
                         <a:solidFill>
                           <a:srgbClr val="000000"/>
                         </a:solidFill>
@@ -7335,7 +7618,7 @@
           </a:xfrm>
           <a:prstGeom prst="bentConnector3">
             <a:avLst>
-              <a:gd name="adj1" fmla="val -2130078"/>
+              <a:gd name="adj1" fmla="val -1530050"/>
             </a:avLst>
           </a:prstGeom>
           <a:ln>
@@ -7602,7 +7885,9 @@
             <a:ext cx="672638" cy="385550"/>
           </a:xfrm>
           <a:prstGeom prst="bentConnector3">
-            <a:avLst/>
+            <a:avLst>
+              <a:gd name="adj1" fmla="val 61488"/>
+            </a:avLst>
           </a:prstGeom>
           <a:ln>
             <a:tailEnd type="triangle"/>
@@ -7679,8 +7964,168 @@
           <a:prstGeom prst="bentConnector5">
             <a:avLst>
               <a:gd name="adj1" fmla="val -5639"/>
-              <a:gd name="adj2" fmla="val 210224"/>
+              <a:gd name="adj2" fmla="val 235320"/>
               <a:gd name="adj3" fmla="val 102232"/>
+            </a:avLst>
+          </a:prstGeom>
+          <a:ln>
+            <a:tailEnd type="triangle"/>
+          </a:ln>
+        </p:spPr>
+        <p:style>
+          <a:lnRef idx="1">
+            <a:schemeClr val="accent1"/>
+          </a:lnRef>
+          <a:fillRef idx="0">
+            <a:schemeClr val="accent1"/>
+          </a:fillRef>
+          <a:effectRef idx="0">
+            <a:schemeClr val="accent1"/>
+          </a:effectRef>
+          <a:fontRef idx="minor">
+            <a:schemeClr val="tx1"/>
+          </a:fontRef>
+        </p:style>
+      </p:cxnSp>
+      <p:cxnSp>
+        <p:nvCxnSpPr>
+          <p:cNvPr id="4" name="Conector angular 3"/>
+          <p:cNvCxnSpPr>
+            <a:stCxn id="113" idx="1"/>
+            <a:endCxn id="2" idx="3"/>
+          </p:cNvCxnSpPr>
+          <p:nvPr/>
+        </p:nvCxnSpPr>
+        <p:spPr>
+          <a:xfrm rot="10800000" flipH="1">
+            <a:off x="2469525" y="1694647"/>
+            <a:ext cx="6225629" cy="1188009"/>
+          </a:xfrm>
+          <a:prstGeom prst="bentConnector5">
+            <a:avLst>
+              <a:gd name="adj1" fmla="val -7189"/>
+              <a:gd name="adj2" fmla="val -221628"/>
+              <a:gd name="adj3" fmla="val 104706"/>
+            </a:avLst>
+          </a:prstGeom>
+          <a:ln>
+            <a:tailEnd type="triangle"/>
+          </a:ln>
+        </p:spPr>
+        <p:style>
+          <a:lnRef idx="1">
+            <a:schemeClr val="accent1"/>
+          </a:lnRef>
+          <a:fillRef idx="0">
+            <a:schemeClr val="accent1"/>
+          </a:fillRef>
+          <a:effectRef idx="0">
+            <a:schemeClr val="accent1"/>
+          </a:effectRef>
+          <a:fontRef idx="minor">
+            <a:schemeClr val="tx1"/>
+          </a:fontRef>
+        </p:style>
+      </p:cxnSp>
+      <p:cxnSp>
+        <p:nvCxnSpPr>
+          <p:cNvPr id="226" name="Conector angular 225"/>
+          <p:cNvCxnSpPr>
+            <a:stCxn id="130" idx="1"/>
+            <a:endCxn id="82" idx="3"/>
+          </p:cNvCxnSpPr>
+          <p:nvPr/>
+        </p:nvCxnSpPr>
+        <p:spPr>
+          <a:xfrm rot="10800000" flipH="1" flipV="1">
+            <a:off x="4285450" y="1031741"/>
+            <a:ext cx="4399489" cy="1086253"/>
+          </a:xfrm>
+          <a:prstGeom prst="bentConnector5">
+            <a:avLst>
+              <a:gd name="adj1" fmla="val -12807"/>
+              <a:gd name="adj2" fmla="val 433178"/>
+              <a:gd name="adj3" fmla="val 105196"/>
+            </a:avLst>
+          </a:prstGeom>
+          <a:ln>
+            <a:tailEnd type="triangle"/>
+          </a:ln>
+        </p:spPr>
+        <p:style>
+          <a:lnRef idx="1">
+            <a:schemeClr val="accent1"/>
+          </a:lnRef>
+          <a:fillRef idx="0">
+            <a:schemeClr val="accent1"/>
+          </a:fillRef>
+          <a:effectRef idx="0">
+            <a:schemeClr val="accent1"/>
+          </a:effectRef>
+          <a:fontRef idx="minor">
+            <a:schemeClr val="tx1"/>
+          </a:fontRef>
+        </p:style>
+      </p:cxnSp>
+      <p:cxnSp>
+        <p:nvCxnSpPr>
+          <p:cNvPr id="232" name="Conector angular 231"/>
+          <p:cNvCxnSpPr>
+            <a:stCxn id="130" idx="1"/>
+            <a:endCxn id="224" idx="3"/>
+          </p:cNvCxnSpPr>
+          <p:nvPr/>
+        </p:nvCxnSpPr>
+        <p:spPr>
+          <a:xfrm rot="10800000" flipH="1" flipV="1">
+            <a:off x="4285450" y="1031741"/>
+            <a:ext cx="4399489" cy="1426727"/>
+          </a:xfrm>
+          <a:prstGeom prst="bentConnector5">
+            <a:avLst>
+              <a:gd name="adj1" fmla="val -14564"/>
+              <a:gd name="adj2" fmla="val 342639"/>
+              <a:gd name="adj3" fmla="val 110172"/>
+            </a:avLst>
+          </a:prstGeom>
+          <a:ln>
+            <a:tailEnd type="triangle"/>
+          </a:ln>
+        </p:spPr>
+        <p:style>
+          <a:lnRef idx="1">
+            <a:schemeClr val="accent1"/>
+          </a:lnRef>
+          <a:fillRef idx="0">
+            <a:schemeClr val="accent1"/>
+          </a:fillRef>
+          <a:effectRef idx="0">
+            <a:schemeClr val="accent1"/>
+          </a:effectRef>
+          <a:fontRef idx="minor">
+            <a:schemeClr val="tx1"/>
+          </a:fontRef>
+        </p:style>
+      </p:cxnSp>
+      <p:cxnSp>
+        <p:nvCxnSpPr>
+          <p:cNvPr id="245" name="Conector angular 244"/>
+          <p:cNvCxnSpPr>
+            <a:stCxn id="130" idx="1"/>
+            <a:endCxn id="83" idx="3"/>
+          </p:cNvCxnSpPr>
+          <p:nvPr/>
+        </p:nvCxnSpPr>
+        <p:spPr>
+          <a:xfrm rot="10800000" flipH="1" flipV="1">
+            <a:off x="4285450" y="1031742"/>
+            <a:ext cx="5803379" cy="920048"/>
+          </a:xfrm>
+          <a:prstGeom prst="bentConnector5">
+            <a:avLst>
+              <a:gd name="adj1" fmla="val -11040"/>
+              <a:gd name="adj2" fmla="val 554192"/>
+              <a:gd name="adj3" fmla="val 125687"/>
             </a:avLst>
           </a:prstGeom>
           <a:ln>

</xml_diff>

<commit_message>
listo todos los controladeres
</commit_message>
<xml_diff>
--- a/docs/MER.pptx
+++ b/docs/MER.pptx
@@ -243,7 +243,7 @@
           <a:p>
             <a:fld id="{1DEE5C8B-0FD6-4D89-9C0E-77ACC5742FB7}" type="datetimeFigureOut">
               <a:rPr lang="es-VE" smtClean="0"/>
-              <a:t>26/7/2021</a:t>
+              <a:t>27/7/2021</a:t>
             </a:fld>
             <a:endParaRPr lang="es-VE"/>
           </a:p>
@@ -413,7 +413,7 @@
           <a:p>
             <a:fld id="{1DEE5C8B-0FD6-4D89-9C0E-77ACC5742FB7}" type="datetimeFigureOut">
               <a:rPr lang="es-VE" smtClean="0"/>
-              <a:t>26/7/2021</a:t>
+              <a:t>27/7/2021</a:t>
             </a:fld>
             <a:endParaRPr lang="es-VE"/>
           </a:p>
@@ -593,7 +593,7 @@
           <a:p>
             <a:fld id="{1DEE5C8B-0FD6-4D89-9C0E-77ACC5742FB7}" type="datetimeFigureOut">
               <a:rPr lang="es-VE" smtClean="0"/>
-              <a:t>26/7/2021</a:t>
+              <a:t>27/7/2021</a:t>
             </a:fld>
             <a:endParaRPr lang="es-VE"/>
           </a:p>
@@ -763,7 +763,7 @@
           <a:p>
             <a:fld id="{1DEE5C8B-0FD6-4D89-9C0E-77ACC5742FB7}" type="datetimeFigureOut">
               <a:rPr lang="es-VE" smtClean="0"/>
-              <a:t>26/7/2021</a:t>
+              <a:t>27/7/2021</a:t>
             </a:fld>
             <a:endParaRPr lang="es-VE"/>
           </a:p>
@@ -1009,7 +1009,7 @@
           <a:p>
             <a:fld id="{1DEE5C8B-0FD6-4D89-9C0E-77ACC5742FB7}" type="datetimeFigureOut">
               <a:rPr lang="es-VE" smtClean="0"/>
-              <a:t>26/7/2021</a:t>
+              <a:t>27/7/2021</a:t>
             </a:fld>
             <a:endParaRPr lang="es-VE"/>
           </a:p>
@@ -1241,7 +1241,7 @@
           <a:p>
             <a:fld id="{1DEE5C8B-0FD6-4D89-9C0E-77ACC5742FB7}" type="datetimeFigureOut">
               <a:rPr lang="es-VE" smtClean="0"/>
-              <a:t>26/7/2021</a:t>
+              <a:t>27/7/2021</a:t>
             </a:fld>
             <a:endParaRPr lang="es-VE"/>
           </a:p>
@@ -1608,7 +1608,7 @@
           <a:p>
             <a:fld id="{1DEE5C8B-0FD6-4D89-9C0E-77ACC5742FB7}" type="datetimeFigureOut">
               <a:rPr lang="es-VE" smtClean="0"/>
-              <a:t>26/7/2021</a:t>
+              <a:t>27/7/2021</a:t>
             </a:fld>
             <a:endParaRPr lang="es-VE"/>
           </a:p>
@@ -1726,7 +1726,7 @@
           <a:p>
             <a:fld id="{1DEE5C8B-0FD6-4D89-9C0E-77ACC5742FB7}" type="datetimeFigureOut">
               <a:rPr lang="es-VE" smtClean="0"/>
-              <a:t>26/7/2021</a:t>
+              <a:t>27/7/2021</a:t>
             </a:fld>
             <a:endParaRPr lang="es-VE"/>
           </a:p>
@@ -1821,7 +1821,7 @@
           <a:p>
             <a:fld id="{1DEE5C8B-0FD6-4D89-9C0E-77ACC5742FB7}" type="datetimeFigureOut">
               <a:rPr lang="es-VE" smtClean="0"/>
-              <a:t>26/7/2021</a:t>
+              <a:t>27/7/2021</a:t>
             </a:fld>
             <a:endParaRPr lang="es-VE"/>
           </a:p>
@@ -2098,7 +2098,7 @@
           <a:p>
             <a:fld id="{1DEE5C8B-0FD6-4D89-9C0E-77ACC5742FB7}" type="datetimeFigureOut">
               <a:rPr lang="es-VE" smtClean="0"/>
-              <a:t>26/7/2021</a:t>
+              <a:t>27/7/2021</a:t>
             </a:fld>
             <a:endParaRPr lang="es-VE"/>
           </a:p>
@@ -2351,7 +2351,7 @@
           <a:p>
             <a:fld id="{1DEE5C8B-0FD6-4D89-9C0E-77ACC5742FB7}" type="datetimeFigureOut">
               <a:rPr lang="es-VE" smtClean="0"/>
-              <a:t>26/7/2021</a:t>
+              <a:t>27/7/2021</a:t>
             </a:fld>
             <a:endParaRPr lang="es-VE"/>
           </a:p>
@@ -2564,7 +2564,7 @@
           <a:p>
             <a:fld id="{1DEE5C8B-0FD6-4D89-9C0E-77ACC5742FB7}" type="datetimeFigureOut">
               <a:rPr lang="es-VE" smtClean="0"/>
-              <a:t>26/7/2021</a:t>
+              <a:t>27/7/2021</a:t>
             </a:fld>
             <a:endParaRPr lang="es-VE"/>
           </a:p>
@@ -4696,12 +4696,12 @@
         <p:spPr>
           <a:xfrm flipH="1">
             <a:off x="602086" y="1922172"/>
-            <a:ext cx="723364" cy="1049025"/>
+            <a:ext cx="723364" cy="1121415"/>
           </a:xfrm>
           <a:prstGeom prst="bentConnector5">
             <a:avLst>
-              <a:gd name="adj1" fmla="val 14689"/>
-              <a:gd name="adj2" fmla="val 10343"/>
+              <a:gd name="adj1" fmla="val -31602"/>
+              <a:gd name="adj2" fmla="val 51019"/>
               <a:gd name="adj3" fmla="val 131602"/>
             </a:avLst>
           </a:prstGeom>
@@ -5201,14 +5201,14 @@
           <p:nvPr>
             <p:extLst>
               <p:ext uri="{D42A27DB-BD31-4B8C-83A1-F6EECF244321}">
-                <p14:modId xmlns:p14="http://schemas.microsoft.com/office/powerpoint/2010/main" val="3131125835"/>
+                <p14:modId xmlns:p14="http://schemas.microsoft.com/office/powerpoint/2010/main" val="920303795"/>
               </p:ext>
             </p:extLst>
           </p:nvPr>
         </p:nvGraphicFramePr>
         <p:xfrm>
           <a:off x="602086" y="2685447"/>
-          <a:ext cx="969136" cy="571500"/>
+          <a:ext cx="969136" cy="716280"/>
         </p:xfrm>
         <a:graphic>
           <a:graphicData uri="http://schemas.openxmlformats.org/drawingml/2006/table">
@@ -5227,10 +5227,10 @@
                     <a:p>
                       <a:pPr algn="ctr" fontAlgn="b"/>
                       <a:r>
-                        <a:rPr lang="es-VE" sz="1100" b="1" u="none" strike="noStrike" dirty="0" err="1">
-                          <a:effectLst/>
-                        </a:rPr>
-                        <a:t>DetallesGrupos</a:t>
+                        <a:rPr lang="es-VE" sz="1100" b="1" u="none" strike="noStrike" dirty="0" err="1" smtClean="0">
+                          <a:effectLst/>
+                        </a:rPr>
+                        <a:t>DetGrupos</a:t>
                       </a:r>
                       <a:endParaRPr lang="es-VE" sz="1100" b="1" i="0" u="none" strike="noStrike" dirty="0">
                         <a:solidFill>
@@ -5277,10 +5277,26 @@
                     <a:p>
                       <a:pPr algn="l" fontAlgn="b"/>
                       <a:r>
-                        <a:rPr lang="es-VE" sz="1100" u="none" strike="noStrike" dirty="0" err="1">
-                          <a:effectLst/>
-                        </a:rPr>
-                        <a:t>id_pais</a:t>
+                        <a:rPr lang="es-VE" sz="1100" u="none" strike="noStrike" dirty="0" err="1" smtClean="0">
+                          <a:effectLst/>
+                        </a:rPr>
+                        <a:t>id_país</a:t>
+                      </a:r>
+                      <a:endParaRPr lang="es-VE" sz="1100" u="none" strike="noStrike" dirty="0" smtClean="0">
+                        <a:effectLst/>
+                      </a:endParaRPr>
+                    </a:p>
+                    <a:p>
+                      <a:pPr algn="l" fontAlgn="b"/>
+                      <a:r>
+                        <a:rPr lang="es-VE" sz="1100" b="0" i="0" u="none" strike="noStrike" dirty="0" err="1" smtClean="0">
+                          <a:solidFill>
+                            <a:srgbClr val="000000"/>
+                          </a:solidFill>
+                          <a:effectLst/>
+                          <a:latin typeface="Calibri" panose="020F0502020204030204" pitchFamily="34" charset="0"/>
+                        </a:rPr>
+                        <a:t>id_det_grupo</a:t>
                       </a:r>
                       <a:endParaRPr lang="es-VE" sz="1100" b="0" i="0" u="none" strike="noStrike" dirty="0">
                         <a:solidFill>
@@ -5307,7 +5323,7 @@
           <p:nvPr>
             <p:extLst>
               <p:ext uri="{D42A27DB-BD31-4B8C-83A1-F6EECF244321}">
-                <p14:modId xmlns:p14="http://schemas.microsoft.com/office/powerpoint/2010/main" val="3177467071"/>
+                <p14:modId xmlns:p14="http://schemas.microsoft.com/office/powerpoint/2010/main" val="2648661822"/>
               </p:ext>
             </p:extLst>
           </p:nvPr>
@@ -5408,12 +5424,12 @@
                     <a:p>
                       <a:pPr algn="l" fontAlgn="b"/>
                       <a:r>
-                        <a:rPr lang="es-VE" sz="1100" u="none" strike="noStrike">
-                          <a:effectLst/>
-                        </a:rPr>
-                        <a:t>tx_ligar</a:t>
-                      </a:r>
-                      <a:endParaRPr lang="es-VE" sz="1100" b="0" i="0" u="none" strike="noStrike">
+                        <a:rPr lang="es-VE" sz="1100" u="none" strike="noStrike" dirty="0" err="1" smtClean="0">
+                          <a:effectLst/>
+                        </a:rPr>
+                        <a:t>tx_lugar</a:t>
+                      </a:r>
+                      <a:endParaRPr lang="es-VE" sz="1100" b="0" i="0" u="none" strike="noStrike" dirty="0">
                         <a:solidFill>
                           <a:srgbClr val="000000"/>
                         </a:solidFill>
@@ -5488,14 +5504,14 @@
           <p:nvPr>
             <p:extLst>
               <p:ext uri="{D42A27DB-BD31-4B8C-83A1-F6EECF244321}">
-                <p14:modId xmlns:p14="http://schemas.microsoft.com/office/powerpoint/2010/main" val="3371756827"/>
+                <p14:modId xmlns:p14="http://schemas.microsoft.com/office/powerpoint/2010/main" val="2733258582"/>
               </p:ext>
             </p:extLst>
           </p:nvPr>
         </p:nvGraphicFramePr>
         <p:xfrm>
           <a:off x="2472744" y="4059660"/>
-          <a:ext cx="943377" cy="571500"/>
+          <a:ext cx="943377" cy="716280"/>
         </p:xfrm>
         <a:graphic>
           <a:graphicData uri="http://schemas.openxmlformats.org/drawingml/2006/table">
@@ -5514,10 +5530,10 @@
                     <a:p>
                       <a:pPr algn="ctr" fontAlgn="b"/>
                       <a:r>
-                        <a:rPr lang="es-VE" sz="1100" b="1" u="none" strike="noStrike" dirty="0" err="1">
-                          <a:effectLst/>
-                        </a:rPr>
-                        <a:t>DetalleSedes</a:t>
+                        <a:rPr lang="es-VE" sz="1100" b="1" u="none" strike="noStrike" dirty="0" err="1" smtClean="0">
+                          <a:effectLst/>
+                        </a:rPr>
+                        <a:t>DetSedes</a:t>
                       </a:r>
                       <a:endParaRPr lang="es-VE" sz="1100" b="1" i="0" u="none" strike="noStrike" dirty="0">
                         <a:solidFill>
@@ -5564,10 +5580,26 @@
                     <a:p>
                       <a:pPr algn="l" fontAlgn="b"/>
                       <a:r>
-                        <a:rPr lang="es-VE" sz="1100" u="none" strike="noStrike" dirty="0" err="1">
+                        <a:rPr lang="es-VE" sz="1100" u="none" strike="noStrike" dirty="0" err="1" smtClean="0">
                           <a:effectLst/>
                         </a:rPr>
                         <a:t>id_copa</a:t>
+                      </a:r>
+                      <a:endParaRPr lang="es-VE" sz="1100" u="none" strike="noStrike" dirty="0" smtClean="0">
+                        <a:effectLst/>
+                      </a:endParaRPr>
+                    </a:p>
+                    <a:p>
+                      <a:pPr algn="l" fontAlgn="b"/>
+                      <a:r>
+                        <a:rPr lang="es-VE" sz="1100" b="0" i="0" u="none" strike="noStrike" dirty="0" err="1" smtClean="0">
+                          <a:solidFill>
+                            <a:srgbClr val="000000"/>
+                          </a:solidFill>
+                          <a:effectLst/>
+                          <a:latin typeface="Calibri" panose="020F0502020204030204" pitchFamily="34" charset="0"/>
+                        </a:rPr>
+                        <a:t>id_det_sedes</a:t>
                       </a:r>
                       <a:endParaRPr lang="es-VE" sz="1100" b="0" i="0" u="none" strike="noStrike" dirty="0">
                         <a:solidFill>
@@ -5750,14 +5782,14 @@
           <p:nvPr>
             <p:extLst>
               <p:ext uri="{D42A27DB-BD31-4B8C-83A1-F6EECF244321}">
-                <p14:modId xmlns:p14="http://schemas.microsoft.com/office/powerpoint/2010/main" val="20801791"/>
+                <p14:modId xmlns:p14="http://schemas.microsoft.com/office/powerpoint/2010/main" val="2152435512"/>
               </p:ext>
             </p:extLst>
           </p:nvPr>
         </p:nvGraphicFramePr>
         <p:xfrm>
-          <a:off x="4204964" y="1566448"/>
-          <a:ext cx="825500" cy="571500"/>
+          <a:off x="4204963" y="1566448"/>
+          <a:ext cx="945523" cy="716280"/>
         </p:xfrm>
         <a:graphic>
           <a:graphicData uri="http://schemas.openxmlformats.org/drawingml/2006/table">
@@ -5766,7 +5798,7 @@
                 <a:tableStyleId>{5C22544A-7EE6-4342-B048-85BDC9FD1C3A}</a:tableStyleId>
               </a:tblPr>
               <a:tblGrid>
-                <a:gridCol w="825500"/>
+                <a:gridCol w="945523"/>
               </a:tblGrid>
               <a:tr h="190500">
                 <a:tc>
@@ -5776,10 +5808,10 @@
                     <a:p>
                       <a:pPr algn="l" fontAlgn="b"/>
                       <a:r>
-                        <a:rPr lang="es-VE" sz="1100" b="1" u="none" strike="noStrike" dirty="0" err="1">
-                          <a:effectLst/>
-                        </a:rPr>
-                        <a:t>DetalleEquipo</a:t>
+                        <a:rPr lang="es-VE" sz="1100" b="1" u="none" strike="noStrike" dirty="0" err="1" smtClean="0">
+                          <a:effectLst/>
+                        </a:rPr>
+                        <a:t>DetEquipo</a:t>
                       </a:r>
                       <a:endParaRPr lang="es-VE" sz="1100" b="1" i="0" u="none" strike="noStrike" dirty="0">
                         <a:solidFill>
@@ -5826,10 +5858,26 @@
                     <a:p>
                       <a:pPr algn="l" fontAlgn="b"/>
                       <a:r>
-                        <a:rPr lang="es-VE" sz="1100" u="none" strike="noStrike" dirty="0" err="1">
+                        <a:rPr lang="es-VE" sz="1100" u="none" strike="noStrike" dirty="0" err="1" smtClean="0">
                           <a:effectLst/>
                         </a:rPr>
                         <a:t>id_jugador</a:t>
+                      </a:r>
+                      <a:endParaRPr lang="es-VE" sz="1100" u="none" strike="noStrike" dirty="0" smtClean="0">
+                        <a:effectLst/>
+                      </a:endParaRPr>
+                    </a:p>
+                    <a:p>
+                      <a:pPr algn="l" fontAlgn="b"/>
+                      <a:r>
+                        <a:rPr lang="es-VE" sz="1100" b="0" i="0" u="none" strike="noStrike" dirty="0" err="1" smtClean="0">
+                          <a:solidFill>
+                            <a:srgbClr val="000000"/>
+                          </a:solidFill>
+                          <a:effectLst/>
+                          <a:latin typeface="Calibri" panose="020F0502020204030204" pitchFamily="34" charset="0"/>
+                        </a:rPr>
+                        <a:t>id_det_equipo</a:t>
                       </a:r>
                       <a:endParaRPr lang="es-VE" sz="1100" b="0" i="0" u="none" strike="noStrike" dirty="0">
                         <a:solidFill>
@@ -6449,7 +6497,7 @@
           <p:nvPr>
             <p:extLst>
               <p:ext uri="{D42A27DB-BD31-4B8C-83A1-F6EECF244321}">
-                <p14:modId xmlns:p14="http://schemas.microsoft.com/office/powerpoint/2010/main" val="4235426054"/>
+                <p14:modId xmlns:p14="http://schemas.microsoft.com/office/powerpoint/2010/main" val="763872659"/>
               </p:ext>
             </p:extLst>
           </p:nvPr>
@@ -6475,10 +6523,10 @@
                     <a:p>
                       <a:pPr algn="ctr" fontAlgn="b"/>
                       <a:r>
-                        <a:rPr lang="es-VE" sz="1100" b="1" u="none" strike="noStrike" dirty="0" err="1">
-                          <a:effectLst/>
-                        </a:rPr>
-                        <a:t>PersonasTecnicas</a:t>
+                        <a:rPr lang="es-VE" sz="1100" b="1" u="none" strike="noStrike" dirty="0" err="1" smtClean="0">
+                          <a:effectLst/>
+                        </a:rPr>
+                        <a:t>PersonasTec</a:t>
                       </a:r>
                       <a:endParaRPr lang="es-VE" sz="1100" b="1" i="0" u="none" strike="noStrike" dirty="0">
                         <a:solidFill>
@@ -6939,14 +6987,14 @@
           <p:nvPr>
             <p:extLst>
               <p:ext uri="{D42A27DB-BD31-4B8C-83A1-F6EECF244321}">
-                <p14:modId xmlns:p14="http://schemas.microsoft.com/office/powerpoint/2010/main" val="1282492558"/>
+                <p14:modId xmlns:p14="http://schemas.microsoft.com/office/powerpoint/2010/main" val="587958964"/>
               </p:ext>
             </p:extLst>
           </p:nvPr>
         </p:nvGraphicFramePr>
         <p:xfrm>
           <a:off x="9359722" y="1447804"/>
-          <a:ext cx="762000" cy="762000"/>
+          <a:ext cx="762000" cy="906780"/>
         </p:xfrm>
         <a:graphic>
           <a:graphicData uri="http://schemas.openxmlformats.org/drawingml/2006/table">
@@ -7040,10 +7088,26 @@
                     <a:p>
                       <a:pPr algn="l" fontAlgn="b"/>
                       <a:r>
-                        <a:rPr lang="es-VE" sz="1100" u="none" strike="noStrike" dirty="0" err="1">
+                        <a:rPr lang="es-VE" sz="1100" u="none" strike="noStrike" dirty="0" err="1" smtClean="0">
                           <a:effectLst/>
                         </a:rPr>
                         <a:t>nu_goles</a:t>
+                      </a:r>
+                      <a:endParaRPr lang="es-VE" sz="1100" u="none" strike="noStrike" dirty="0" smtClean="0">
+                        <a:effectLst/>
+                      </a:endParaRPr>
+                    </a:p>
+                    <a:p>
+                      <a:pPr algn="l" fontAlgn="b"/>
+                      <a:r>
+                        <a:rPr lang="es-VE" sz="1100" b="0" i="0" u="none" strike="noStrike" dirty="0" err="1" smtClean="0">
+                          <a:solidFill>
+                            <a:srgbClr val="000000"/>
+                          </a:solidFill>
+                          <a:effectLst/>
+                          <a:latin typeface="Calibri" panose="020F0502020204030204" pitchFamily="34" charset="0"/>
+                        </a:rPr>
+                        <a:t>id_penaltis</a:t>
                       </a:r>
                       <a:endParaRPr lang="es-VE" sz="1100" b="0" i="0" u="none" strike="noStrike" dirty="0">
                         <a:solidFill>
@@ -7070,7 +7134,7 @@
           <p:nvPr>
             <p:extLst>
               <p:ext uri="{D42A27DB-BD31-4B8C-83A1-F6EECF244321}">
-                <p14:modId xmlns:p14="http://schemas.microsoft.com/office/powerpoint/2010/main" val="4094858524"/>
+                <p14:modId xmlns:p14="http://schemas.microsoft.com/office/powerpoint/2010/main" val="1006899828"/>
               </p:ext>
             </p:extLst>
           </p:nvPr>
@@ -7096,10 +7160,10 @@
                     <a:p>
                       <a:pPr algn="ctr" fontAlgn="b"/>
                       <a:r>
-                        <a:rPr lang="es-VE" sz="1100" b="1" u="none" strike="noStrike" dirty="0" err="1">
-                          <a:effectLst/>
-                        </a:rPr>
-                        <a:t>TipoPersonaTecnica</a:t>
+                        <a:rPr lang="es-VE" sz="1100" b="1" u="none" strike="noStrike" dirty="0" err="1" smtClean="0">
+                          <a:effectLst/>
+                        </a:rPr>
+                        <a:t>TipPersonaTec</a:t>
                       </a:r>
                       <a:endParaRPr lang="es-VE" sz="1100" b="1" i="0" u="none" strike="noStrike" dirty="0">
                         <a:solidFill>
@@ -7282,14 +7346,14 @@
           <p:nvPr>
             <p:extLst>
               <p:ext uri="{D42A27DB-BD31-4B8C-83A1-F6EECF244321}">
-                <p14:modId xmlns:p14="http://schemas.microsoft.com/office/powerpoint/2010/main" val="2883460439"/>
+                <p14:modId xmlns:p14="http://schemas.microsoft.com/office/powerpoint/2010/main" val="1671503379"/>
               </p:ext>
             </p:extLst>
           </p:nvPr>
         </p:nvGraphicFramePr>
         <p:xfrm>
           <a:off x="9538994" y="2768853"/>
-          <a:ext cx="1390918" cy="1714500"/>
+          <a:ext cx="1390918" cy="1859280"/>
         </p:xfrm>
         <a:graphic>
           <a:graphicData uri="http://schemas.openxmlformats.org/drawingml/2006/table">
@@ -7508,10 +7572,26 @@
                     <a:p>
                       <a:pPr algn="l" fontAlgn="b"/>
                       <a:r>
-                        <a:rPr lang="es-VE" sz="1100" u="none" strike="noStrike" dirty="0" err="1">
+                        <a:rPr lang="es-VE" sz="1100" u="none" strike="noStrike" dirty="0" err="1" smtClean="0">
                           <a:effectLst/>
                         </a:rPr>
                         <a:t>nu_golesContra</a:t>
+                      </a:r>
+                      <a:endParaRPr lang="es-VE" sz="1100" u="none" strike="noStrike" dirty="0" smtClean="0">
+                        <a:effectLst/>
+                      </a:endParaRPr>
+                    </a:p>
+                    <a:p>
+                      <a:pPr algn="l" fontAlgn="b"/>
+                      <a:r>
+                        <a:rPr lang="es-VE" sz="1100" b="0" i="0" u="none" strike="noStrike" dirty="0" err="1" smtClean="0">
+                          <a:solidFill>
+                            <a:srgbClr val="000000"/>
+                          </a:solidFill>
+                          <a:effectLst/>
+                          <a:latin typeface="Calibri" panose="020F0502020204030204" pitchFamily="34" charset="0"/>
+                        </a:rPr>
+                        <a:t>id_puntos</a:t>
                       </a:r>
                       <a:endParaRPr lang="es-VE" sz="1100" b="0" i="0" u="none" strike="noStrike" dirty="0">
                         <a:solidFill>
@@ -7652,7 +7732,7 @@
         <p:spPr>
           <a:xfrm rot="10800000" flipH="1" flipV="1">
             <a:off x="2469526" y="2882654"/>
-            <a:ext cx="3218" cy="1462755"/>
+            <a:ext cx="3218" cy="1535145"/>
           </a:xfrm>
           <a:prstGeom prst="bentConnector3">
             <a:avLst>

</xml_diff>